<commit_message>
update lesson02 : add task
</commit_message>
<xml_diff>
--- a/lesson2_变量和输入.pptx
+++ b/lesson2_变量和输入.pptx
@@ -266,7 +266,7 @@
           <a:p>
             <a:fld id="{22D436FC-F091-4AE9-B70A-0472607F6651}" type="datetimeFigureOut">
               <a:rPr lang="zh-CN" altLang="en-US" smtClean="0"/>
-              <a:t>2022/9/17</a:t>
+              <a:t>2022/10/8</a:t>
             </a:fld>
             <a:endParaRPr lang="zh-CN" altLang="en-US"/>
           </a:p>
@@ -464,7 +464,7 @@
           <a:p>
             <a:fld id="{22D436FC-F091-4AE9-B70A-0472607F6651}" type="datetimeFigureOut">
               <a:rPr lang="zh-CN" altLang="en-US" smtClean="0"/>
-              <a:t>2022/9/17</a:t>
+              <a:t>2022/10/8</a:t>
             </a:fld>
             <a:endParaRPr lang="zh-CN" altLang="en-US"/>
           </a:p>
@@ -672,7 +672,7 @@
           <a:p>
             <a:fld id="{22D436FC-F091-4AE9-B70A-0472607F6651}" type="datetimeFigureOut">
               <a:rPr lang="zh-CN" altLang="en-US" smtClean="0"/>
-              <a:t>2022/9/17</a:t>
+              <a:t>2022/10/8</a:t>
             </a:fld>
             <a:endParaRPr lang="zh-CN" altLang="en-US"/>
           </a:p>
@@ -870,7 +870,7 @@
           <a:p>
             <a:fld id="{22D436FC-F091-4AE9-B70A-0472607F6651}" type="datetimeFigureOut">
               <a:rPr lang="zh-CN" altLang="en-US" smtClean="0"/>
-              <a:t>2022/9/17</a:t>
+              <a:t>2022/10/8</a:t>
             </a:fld>
             <a:endParaRPr lang="zh-CN" altLang="en-US"/>
           </a:p>
@@ -1145,7 +1145,7 @@
           <a:p>
             <a:fld id="{22D436FC-F091-4AE9-B70A-0472607F6651}" type="datetimeFigureOut">
               <a:rPr lang="zh-CN" altLang="en-US" smtClean="0"/>
-              <a:t>2022/9/17</a:t>
+              <a:t>2022/10/8</a:t>
             </a:fld>
             <a:endParaRPr lang="zh-CN" altLang="en-US"/>
           </a:p>
@@ -1410,7 +1410,7 @@
           <a:p>
             <a:fld id="{22D436FC-F091-4AE9-B70A-0472607F6651}" type="datetimeFigureOut">
               <a:rPr lang="zh-CN" altLang="en-US" smtClean="0"/>
-              <a:t>2022/9/17</a:t>
+              <a:t>2022/10/8</a:t>
             </a:fld>
             <a:endParaRPr lang="zh-CN" altLang="en-US"/>
           </a:p>
@@ -1822,7 +1822,7 @@
           <a:p>
             <a:fld id="{22D436FC-F091-4AE9-B70A-0472607F6651}" type="datetimeFigureOut">
               <a:rPr lang="zh-CN" altLang="en-US" smtClean="0"/>
-              <a:t>2022/9/17</a:t>
+              <a:t>2022/10/8</a:t>
             </a:fld>
             <a:endParaRPr lang="zh-CN" altLang="en-US"/>
           </a:p>
@@ -1963,7 +1963,7 @@
           <a:p>
             <a:fld id="{22D436FC-F091-4AE9-B70A-0472607F6651}" type="datetimeFigureOut">
               <a:rPr lang="zh-CN" altLang="en-US" smtClean="0"/>
-              <a:t>2022/9/17</a:t>
+              <a:t>2022/10/8</a:t>
             </a:fld>
             <a:endParaRPr lang="zh-CN" altLang="en-US"/>
           </a:p>
@@ -2076,7 +2076,7 @@
           <a:p>
             <a:fld id="{22D436FC-F091-4AE9-B70A-0472607F6651}" type="datetimeFigureOut">
               <a:rPr lang="zh-CN" altLang="en-US" smtClean="0"/>
-              <a:t>2022/9/17</a:t>
+              <a:t>2022/10/8</a:t>
             </a:fld>
             <a:endParaRPr lang="zh-CN" altLang="en-US"/>
           </a:p>
@@ -2387,7 +2387,7 @@
           <a:p>
             <a:fld id="{22D436FC-F091-4AE9-B70A-0472607F6651}" type="datetimeFigureOut">
               <a:rPr lang="zh-CN" altLang="en-US" smtClean="0"/>
-              <a:t>2022/9/17</a:t>
+              <a:t>2022/10/8</a:t>
             </a:fld>
             <a:endParaRPr lang="zh-CN" altLang="en-US"/>
           </a:p>
@@ -2675,7 +2675,7 @@
           <a:p>
             <a:fld id="{22D436FC-F091-4AE9-B70A-0472607F6651}" type="datetimeFigureOut">
               <a:rPr lang="zh-CN" altLang="en-US" smtClean="0"/>
-              <a:t>2022/9/17</a:t>
+              <a:t>2022/10/8</a:t>
             </a:fld>
             <a:endParaRPr lang="zh-CN" altLang="en-US"/>
           </a:p>
@@ -2916,7 +2916,7 @@
           <a:p>
             <a:fld id="{22D436FC-F091-4AE9-B70A-0472607F6651}" type="datetimeFigureOut">
               <a:rPr lang="zh-CN" altLang="en-US" smtClean="0"/>
-              <a:t>2022/9/17</a:t>
+              <a:t>2022/10/8</a:t>
             </a:fld>
             <a:endParaRPr lang="zh-CN" altLang="en-US"/>
           </a:p>
@@ -4222,6 +4222,9 @@
             </a:r>
           </a:p>
           <a:p>
+            <a:pPr marL="0" indent="0">
+              <a:buNone/>
+            </a:pPr>
             <a:r>
               <a:rPr lang="zh-CN" altLang="en-US" dirty="0"/>
               <a:t>怎么把</a:t>
@@ -4270,6 +4273,28 @@
               <a:rPr lang="en-US" altLang="zh-CN" dirty="0"/>
               <a:t>a</a:t>
             </a:r>
+          </a:p>
+          <a:p>
+            <a:endParaRPr lang="en-US" altLang="zh-CN" dirty="0"/>
+          </a:p>
+          <a:p>
+            <a:r>
+              <a:rPr lang="zh-CN" altLang="en-US" dirty="0"/>
+              <a:t>求圆面积，输入半径，输出面积</a:t>
+            </a:r>
+            <a:endParaRPr lang="en-US" altLang="zh-CN" dirty="0"/>
+          </a:p>
+          <a:p>
+            <a:endParaRPr lang="en-US" altLang="zh-CN" dirty="0"/>
+          </a:p>
+          <a:p>
+            <a:r>
+              <a:rPr lang="zh-CN" altLang="en-US" dirty="0"/>
+              <a:t>求长方形面积，输入长和宽，输出面积</a:t>
+            </a:r>
+            <a:endParaRPr lang="en-US" altLang="zh-CN" dirty="0"/>
+          </a:p>
+          <a:p>
             <a:endParaRPr lang="zh-CN" altLang="en-US" dirty="0"/>
           </a:p>
         </p:txBody>

</xml_diff>